<commit_message>
add video cover 002
</commit_message>
<xml_diff>
--- a/使用Protégé建立中国传统医学本体模型.pptx
+++ b/使用Protégé建立中国传统医学本体模型.pptx
@@ -5,11 +5,12 @@
     <p:sldMasterId id="2147483684" r:id="rId1"/>
   </p:sldMasterIdLst>
   <p:notesMasterIdLst>
-    <p:notesMasterId r:id="rId4"/>
+    <p:notesMasterId r:id="rId5"/>
   </p:notesMasterIdLst>
   <p:sldIdLst>
     <p:sldId id="272" r:id="rId2"/>
     <p:sldId id="273" r:id="rId3"/>
+    <p:sldId id="274" r:id="rId4"/>
   </p:sldIdLst>
   <p:sldSz cx="12192000" cy="6858000"/>
   <p:notesSz cx="6858000" cy="9144000"/>
@@ -198,7 +199,7 @@
           <a:p>
             <a:fld id="{71BD4573-58E7-4156-A133-2731F5F8D1A6}" type="datetimeFigureOut">
               <a:rPr lang="en-US" smtClean="0"/>
-              <a:t>11/21/2023</a:t>
+              <a:t>11/26/2023</a:t>
             </a:fld>
             <a:endParaRPr lang="en-US"/>
           </a:p>
@@ -540,6 +541,90 @@
     <p:extLst>
       <p:ext uri="{BB962C8B-B14F-4D97-AF65-F5344CB8AC3E}">
         <p14:creationId xmlns:p14="http://schemas.microsoft.com/office/powerpoint/2010/main" val="1495133884"/>
+      </p:ext>
+    </p:extLst>
+  </p:cSld>
+  <p:clrMapOvr>
+    <a:masterClrMapping/>
+  </p:clrMapOvr>
+</p:notes>
+</file>
+
+<file path=ppt/notesSlides/notesSlide2.xml><?xml version="1.0" encoding="utf-8"?>
+<p:notes xmlns:a="http://schemas.openxmlformats.org/drawingml/2006/main" xmlns:r="http://schemas.openxmlformats.org/officeDocument/2006/relationships" xmlns:p="http://schemas.openxmlformats.org/presentationml/2006/main">
+  <p:cSld>
+    <p:spTree>
+      <p:nvGrpSpPr>
+        <p:cNvPr id="1" name=""/>
+        <p:cNvGrpSpPr/>
+        <p:nvPr/>
+      </p:nvGrpSpPr>
+      <p:grpSpPr>
+        <a:xfrm>
+          <a:off x="0" y="0"/>
+          <a:ext cx="0" cy="0"/>
+          <a:chOff x="0" y="0"/>
+          <a:chExt cx="0" cy="0"/>
+        </a:xfrm>
+      </p:grpSpPr>
+      <p:sp>
+        <p:nvSpPr>
+          <p:cNvPr id="2" name="Slide Image Placeholder 1"/>
+          <p:cNvSpPr>
+            <a:spLocks noGrp="1" noRot="1" noChangeAspect="1"/>
+          </p:cNvSpPr>
+          <p:nvPr>
+            <p:ph type="sldImg"/>
+          </p:nvPr>
+        </p:nvSpPr>
+        <p:spPr/>
+      </p:sp>
+      <p:sp>
+        <p:nvSpPr>
+          <p:cNvPr id="3" name="Notes Placeholder 2"/>
+          <p:cNvSpPr>
+            <a:spLocks noGrp="1"/>
+          </p:cNvSpPr>
+          <p:nvPr>
+            <p:ph type="body" idx="1"/>
+          </p:nvPr>
+        </p:nvSpPr>
+        <p:spPr/>
+        <p:txBody>
+          <a:bodyPr/>
+          <a:lstStyle/>
+          <a:p>
+            <a:endParaRPr lang="en-US"/>
+          </a:p>
+        </p:txBody>
+      </p:sp>
+      <p:sp>
+        <p:nvSpPr>
+          <p:cNvPr id="4" name="Slide Number Placeholder 3"/>
+          <p:cNvSpPr>
+            <a:spLocks noGrp="1"/>
+          </p:cNvSpPr>
+          <p:nvPr>
+            <p:ph type="sldNum" sz="quarter" idx="10"/>
+          </p:nvPr>
+        </p:nvSpPr>
+        <p:spPr/>
+        <p:txBody>
+          <a:bodyPr/>
+          <a:lstStyle/>
+          <a:p>
+            <a:fld id="{893B0CF2-7F87-4E02-A248-870047730F99}" type="slidenum">
+              <a:rPr lang="en-US" smtClean="0"/>
+              <a:t>3</a:t>
+            </a:fld>
+            <a:endParaRPr lang="en-US"/>
+          </a:p>
+        </p:txBody>
+      </p:sp>
+    </p:spTree>
+    <p:extLst>
+      <p:ext uri="{BB962C8B-B14F-4D97-AF65-F5344CB8AC3E}">
+        <p14:creationId xmlns:p14="http://schemas.microsoft.com/office/powerpoint/2010/main" val="1017453790"/>
       </p:ext>
     </p:extLst>
   </p:cSld>
@@ -863,7 +948,7 @@
           <a:p>
             <a:fld id="{021A1D30-C0A0-4124-A783-34D9F15FA0FE}" type="datetime1">
               <a:rPr lang="en-US" smtClean="0"/>
-              <a:t>11/21/2023</a:t>
+              <a:t>11/26/2023</a:t>
             </a:fld>
             <a:endParaRPr lang="en-US"/>
           </a:p>
@@ -1047,7 +1132,7 @@
           <a:p>
             <a:fld id="{8D2D5871-AB0F-4B3D-8861-97E78CB7B47E}" type="datetime1">
               <a:rPr lang="en-US" smtClean="0"/>
-              <a:t>11/21/2023</a:t>
+              <a:t>11/26/2023</a:t>
             </a:fld>
             <a:endParaRPr lang="en-US"/>
           </a:p>
@@ -1241,7 +1326,7 @@
           <a:p>
             <a:fld id="{14418406-4C3F-4F3E-80BD-A22568EA37EB}" type="datetime1">
               <a:rPr lang="en-US" smtClean="0"/>
-              <a:t>11/21/2023</a:t>
+              <a:t>11/26/2023</a:t>
             </a:fld>
             <a:endParaRPr lang="en-US"/>
           </a:p>
@@ -1425,7 +1510,7 @@
           <a:p>
             <a:fld id="{65F28077-7188-48C5-8679-2287FAC952E9}" type="datetime1">
               <a:rPr lang="en-US" smtClean="0"/>
-              <a:t>11/21/2023</a:t>
+              <a:t>11/26/2023</a:t>
             </a:fld>
             <a:endParaRPr lang="en-US"/>
           </a:p>
@@ -1672,7 +1757,7 @@
           <a:p>
             <a:fld id="{D2DCB740-6776-4EE9-99FD-96D592FA5A23}" type="datetime1">
               <a:rPr lang="en-US" smtClean="0"/>
-              <a:t>11/21/2023</a:t>
+              <a:t>11/26/2023</a:t>
             </a:fld>
             <a:endParaRPr lang="en-US"/>
           </a:p>
@@ -1955,7 +2040,7 @@
           <a:p>
             <a:fld id="{05F6BD99-6FFD-46C5-B5E2-43A34BDA2566}" type="datetime1">
               <a:rPr lang="en-US" smtClean="0"/>
-              <a:t>11/21/2023</a:t>
+              <a:t>11/26/2023</a:t>
             </a:fld>
             <a:endParaRPr lang="en-US"/>
           </a:p>
@@ -2352,7 +2437,7 @@
           <a:p>
             <a:fld id="{E022678E-214C-4CF8-97C7-95015FB02960}" type="datetime1">
               <a:rPr lang="en-US" smtClean="0"/>
-              <a:t>11/21/2023</a:t>
+              <a:t>11/26/2023</a:t>
             </a:fld>
             <a:endParaRPr lang="en-US"/>
           </a:p>
@@ -2521,7 +2606,7 @@
           <a:p>
             <a:fld id="{D55660E0-FA77-4473-A859-74127B089143}" type="datetime1">
               <a:rPr lang="en-US" smtClean="0"/>
-              <a:t>11/21/2023</a:t>
+              <a:t>11/26/2023</a:t>
             </a:fld>
             <a:endParaRPr lang="en-US"/>
           </a:p>
@@ -2631,7 +2716,7 @@
           <a:p>
             <a:fld id="{3188D7B8-9F07-4899-827D-5F3CFDDEB574}" type="datetime1">
               <a:rPr lang="en-US" smtClean="0"/>
-              <a:t>11/21/2023</a:t>
+              <a:t>11/26/2023</a:t>
             </a:fld>
             <a:endParaRPr lang="en-US"/>
           </a:p>
@@ -2911,7 +2996,7 @@
           <a:p>
             <a:fld id="{B5197C5C-1CD1-417D-A89C-14747F5222C7}" type="datetime1">
               <a:rPr lang="en-US" smtClean="0"/>
-              <a:t>11/21/2023</a:t>
+              <a:t>11/26/2023</a:t>
             </a:fld>
             <a:endParaRPr lang="en-US"/>
           </a:p>
@@ -3264,7 +3349,7 @@
           <a:p>
             <a:fld id="{1359EFBB-CFA1-4AA8-9123-F0B52DBD84FE}" type="datetime1">
               <a:rPr lang="en-US" smtClean="0"/>
-              <a:t>11/21/2023</a:t>
+              <a:t>11/26/2023</a:t>
             </a:fld>
             <a:endParaRPr lang="en-US"/>
           </a:p>
@@ -4298,7 +4383,7 @@
             <a:fld id="{61146459-E3C3-4969-9224-5ED50B492D17}" type="datetime1">
               <a:rPr lang="en-US" smtClean="0"/>
               <a:pPr/>
-              <a:t>11/21/2023</a:t>
+              <a:t>11/26/2023</a:t>
             </a:fld>
             <a:endParaRPr lang="en-US" dirty="0"/>
           </a:p>
@@ -5311,6 +5396,495 @@
     <p:extLst>
       <p:ext uri="{BB962C8B-B14F-4D97-AF65-F5344CB8AC3E}">
         <p14:creationId xmlns:p14="http://schemas.microsoft.com/office/powerpoint/2010/main" val="2748547115"/>
+      </p:ext>
+    </p:extLst>
+  </p:cSld>
+  <p:clrMapOvr>
+    <a:masterClrMapping/>
+  </p:clrMapOvr>
+  <mc:AlternateContent xmlns:mc="http://schemas.openxmlformats.org/markup-compatibility/2006" xmlns:p14="http://schemas.microsoft.com/office/powerpoint/2010/main">
+    <mc:Choice Requires="p14">
+      <p:transition spd="med" p14:dur="700">
+        <p:fade/>
+      </p:transition>
+    </mc:Choice>
+    <mc:Fallback xmlns="">
+      <p:transition spd="med">
+        <p:fade/>
+      </p:transition>
+    </mc:Fallback>
+  </mc:AlternateContent>
+</p:sld>
+</file>
+
+<file path=ppt/slides/slide3.xml><?xml version="1.0" encoding="utf-8"?>
+<p:sld xmlns:a="http://schemas.openxmlformats.org/drawingml/2006/main" xmlns:r="http://schemas.openxmlformats.org/officeDocument/2006/relationships" xmlns:p="http://schemas.openxmlformats.org/presentationml/2006/main">
+  <p:cSld>
+    <p:spTree>
+      <p:nvGrpSpPr>
+        <p:cNvPr id="1" name=""/>
+        <p:cNvGrpSpPr/>
+        <p:nvPr/>
+      </p:nvGrpSpPr>
+      <p:grpSpPr>
+        <a:xfrm>
+          <a:off x="0" y="0"/>
+          <a:ext cx="0" cy="0"/>
+          <a:chOff x="0" y="0"/>
+          <a:chExt cx="0" cy="0"/>
+        </a:xfrm>
+      </p:grpSpPr>
+      <p:sp>
+        <p:nvSpPr>
+          <p:cNvPr id="4" name="Title 3"/>
+          <p:cNvSpPr>
+            <a:spLocks noGrp="1"/>
+          </p:cNvSpPr>
+          <p:nvPr>
+            <p:ph type="ctrTitle"/>
+          </p:nvPr>
+        </p:nvSpPr>
+        <p:spPr>
+          <a:xfrm>
+            <a:off x="715264" y="349246"/>
+            <a:ext cx="10468864" cy="1828800"/>
+          </a:xfrm>
+        </p:spPr>
+        <p:txBody>
+          <a:bodyPr>
+            <a:normAutofit/>
+          </a:bodyPr>
+          <a:lstStyle/>
+          <a:p>
+            <a:r>
+              <a:rPr lang="zh-CN" altLang="en-US" sz="4400" dirty="0"/>
+              <a:t>使用</a:t>
+            </a:r>
+            <a:r>
+              <a:rPr lang="en-US" altLang="zh-CN" sz="4400" dirty="0"/>
+              <a:t>Protégé</a:t>
+            </a:r>
+            <a:r>
+              <a:rPr lang="zh-CN" altLang="en-US" sz="4400" dirty="0"/>
+              <a:t>建立中国传统医学本体模型</a:t>
+            </a:r>
+            <a:r>
+              <a:rPr lang="en-US" altLang="zh-CN" sz="4400" dirty="0"/>
+              <a:t>Ontology - 002</a:t>
+            </a:r>
+            <a:endParaRPr lang="en-US" sz="4400" dirty="0"/>
+          </a:p>
+        </p:txBody>
+      </p:sp>
+      <p:sp>
+        <p:nvSpPr>
+          <p:cNvPr id="5" name="Subtitle 4"/>
+          <p:cNvSpPr>
+            <a:spLocks noGrp="1"/>
+          </p:cNvSpPr>
+          <p:nvPr>
+            <p:ph type="subTitle" idx="1"/>
+          </p:nvPr>
+        </p:nvSpPr>
+        <p:spPr>
+          <a:xfrm>
+            <a:off x="9215718" y="5465590"/>
+            <a:ext cx="1968410" cy="498783"/>
+          </a:xfrm>
+        </p:spPr>
+        <p:txBody>
+          <a:bodyPr/>
+          <a:lstStyle/>
+          <a:p>
+            <a:r>
+              <a:rPr lang="en-US" dirty="0"/>
+              <a:t>Xiaoqi Zhao</a:t>
+            </a:r>
+          </a:p>
+          <a:p>
+            <a:endParaRPr lang="en-US" dirty="0"/>
+          </a:p>
+        </p:txBody>
+      </p:sp>
+      <p:sp>
+        <p:nvSpPr>
+          <p:cNvPr id="2" name="TextBox 1">
+            <a:extLst>
+              <a:ext uri="{FF2B5EF4-FFF2-40B4-BE49-F238E27FC236}">
+                <a16:creationId xmlns:a16="http://schemas.microsoft.com/office/drawing/2014/main" id="{73A66BBE-F179-5F48-8051-3672205AD659}"/>
+              </a:ext>
+            </a:extLst>
+          </p:cNvPr>
+          <p:cNvSpPr txBox="1"/>
+          <p:nvPr/>
+        </p:nvSpPr>
+        <p:spPr>
+          <a:xfrm>
+            <a:off x="1255058" y="5253317"/>
+            <a:ext cx="7207294" cy="923330"/>
+          </a:xfrm>
+          <a:prstGeom prst="rect">
+            <a:avLst/>
+          </a:prstGeom>
+          <a:solidFill>
+            <a:schemeClr val="accent3">
+              <a:lumMod val="20000"/>
+              <a:lumOff val="80000"/>
+            </a:schemeClr>
+          </a:solidFill>
+          <a:ln>
+            <a:solidFill>
+              <a:schemeClr val="bg2"/>
+            </a:solidFill>
+          </a:ln>
+        </p:spPr>
+        <p:txBody>
+          <a:bodyPr wrap="none" rtlCol="0">
+            <a:spAutoFit/>
+          </a:bodyPr>
+          <a:lstStyle/>
+          <a:p>
+            <a:r>
+              <a:rPr lang="en-US" dirty="0"/>
+              <a:t>GitHub: </a:t>
+            </a:r>
+            <a:r>
+              <a:rPr lang="en-US" dirty="0">
+                <a:hlinkClick r:id="rId3"/>
+              </a:rPr>
+              <a:t>https://github.com/yasenstar/Traditional_Chinese_Medicine</a:t>
+            </a:r>
+            <a:endParaRPr lang="en-US" dirty="0"/>
+          </a:p>
+          <a:p>
+            <a:endParaRPr lang="en-US" dirty="0"/>
+          </a:p>
+          <a:p>
+            <a:r>
+              <a:rPr lang="en-US" dirty="0"/>
+              <a:t>Gitee: </a:t>
+            </a:r>
+            <a:r>
+              <a:rPr lang="en-US" dirty="0">
+                <a:hlinkClick r:id="rId4"/>
+              </a:rPr>
+              <a:t>https://gitee.com/yasenstar/Traditional_Chinese_Medicine</a:t>
+            </a:r>
+            <a:endParaRPr lang="en-US" dirty="0"/>
+          </a:p>
+        </p:txBody>
+      </p:sp>
+      <p:sp>
+        <p:nvSpPr>
+          <p:cNvPr id="3" name="Subtitle 4">
+            <a:extLst>
+              <a:ext uri="{FF2B5EF4-FFF2-40B4-BE49-F238E27FC236}">
+                <a16:creationId xmlns:a16="http://schemas.microsoft.com/office/drawing/2014/main" id="{D39D7665-E3EE-818A-A445-2B1DE66F9A46}"/>
+              </a:ext>
+            </a:extLst>
+          </p:cNvPr>
+          <p:cNvSpPr txBox="1">
+            <a:spLocks/>
+          </p:cNvSpPr>
+          <p:nvPr/>
+        </p:nvSpPr>
+        <p:spPr>
+          <a:xfrm>
+            <a:off x="1443317" y="1928654"/>
+            <a:ext cx="5988423" cy="2751301"/>
+          </a:xfrm>
+          <a:prstGeom prst="rect">
+            <a:avLst/>
+          </a:prstGeom>
+        </p:spPr>
+        <p:txBody>
+          <a:bodyPr vert="horz" lIns="0" rIns="18288">
+            <a:normAutofit/>
+          </a:bodyPr>
+          <a:lstStyle>
+            <a:lvl1pPr marL="0" marR="45720" indent="0" algn="r" rtl="0" eaLnBrk="1" latinLnBrk="0" hangingPunct="1">
+              <a:spcBef>
+                <a:spcPct val="20000"/>
+              </a:spcBef>
+              <a:buClr>
+                <a:schemeClr val="accent3">
+                  <a:lumMod val="50000"/>
+                </a:schemeClr>
+              </a:buClr>
+              <a:buSzPct val="95000"/>
+              <a:buFont typeface="Wingdings 2"/>
+              <a:buNone/>
+              <a:defRPr kumimoji="0" sz="2600" kern="1200">
+                <a:solidFill>
+                  <a:schemeClr val="tx1"/>
+                </a:solidFill>
+                <a:latin typeface="+mn-lt"/>
+                <a:ea typeface="+mn-ea"/>
+                <a:cs typeface="+mn-cs"/>
+              </a:defRPr>
+            </a:lvl1pPr>
+            <a:lvl2pPr marL="457200" indent="0" algn="ctr" rtl="0" eaLnBrk="1" latinLnBrk="0" hangingPunct="1">
+              <a:spcBef>
+                <a:spcPct val="20000"/>
+              </a:spcBef>
+              <a:buClr>
+                <a:schemeClr val="accent1">
+                  <a:lumMod val="50000"/>
+                </a:schemeClr>
+              </a:buClr>
+              <a:buSzPct val="85000"/>
+              <a:buFont typeface="Wingdings 2"/>
+              <a:buNone/>
+              <a:defRPr kumimoji="0" sz="2400" kern="1200">
+                <a:solidFill>
+                  <a:schemeClr val="tx1"/>
+                </a:solidFill>
+                <a:latin typeface="+mn-lt"/>
+                <a:ea typeface="+mn-ea"/>
+                <a:cs typeface="+mn-cs"/>
+              </a:defRPr>
+            </a:lvl2pPr>
+            <a:lvl3pPr marL="914400" indent="0" algn="ctr" rtl="0" eaLnBrk="1" latinLnBrk="0" hangingPunct="1">
+              <a:spcBef>
+                <a:spcPct val="20000"/>
+              </a:spcBef>
+              <a:buClr>
+                <a:schemeClr val="accent2">
+                  <a:lumMod val="50000"/>
+                </a:schemeClr>
+              </a:buClr>
+              <a:buSzPct val="70000"/>
+              <a:buFont typeface="Wingdings 2"/>
+              <a:buNone/>
+              <a:defRPr kumimoji="0" sz="2100" kern="1200">
+                <a:solidFill>
+                  <a:schemeClr val="tx1"/>
+                </a:solidFill>
+                <a:latin typeface="+mn-lt"/>
+                <a:ea typeface="+mn-ea"/>
+                <a:cs typeface="+mn-cs"/>
+              </a:defRPr>
+            </a:lvl3pPr>
+            <a:lvl4pPr marL="1371600" indent="0" algn="ctr" rtl="0" eaLnBrk="1" latinLnBrk="0" hangingPunct="1">
+              <a:spcBef>
+                <a:spcPct val="20000"/>
+              </a:spcBef>
+              <a:buClr>
+                <a:schemeClr val="accent3">
+                  <a:lumMod val="50000"/>
+                </a:schemeClr>
+              </a:buClr>
+              <a:buSzPct val="65000"/>
+              <a:buFont typeface="Wingdings 2"/>
+              <a:buNone/>
+              <a:defRPr kumimoji="0" sz="2000" kern="1200">
+                <a:solidFill>
+                  <a:schemeClr val="tx1"/>
+                </a:solidFill>
+                <a:latin typeface="+mn-lt"/>
+                <a:ea typeface="+mn-ea"/>
+                <a:cs typeface="+mn-cs"/>
+              </a:defRPr>
+            </a:lvl4pPr>
+            <a:lvl5pPr marL="1828800" indent="0" algn="ctr" rtl="0" eaLnBrk="1" latinLnBrk="0" hangingPunct="1">
+              <a:spcBef>
+                <a:spcPct val="20000"/>
+              </a:spcBef>
+              <a:buClr>
+                <a:schemeClr val="accent4">
+                  <a:lumMod val="75000"/>
+                </a:schemeClr>
+              </a:buClr>
+              <a:buSzPct val="65000"/>
+              <a:buFont typeface="Wingdings 2"/>
+              <a:buNone/>
+              <a:defRPr kumimoji="0" sz="2000" kern="1200">
+                <a:solidFill>
+                  <a:schemeClr val="tx1"/>
+                </a:solidFill>
+                <a:latin typeface="+mn-lt"/>
+                <a:ea typeface="+mn-ea"/>
+                <a:cs typeface="+mn-cs"/>
+              </a:defRPr>
+            </a:lvl5pPr>
+            <a:lvl6pPr marL="2286000" indent="0" algn="ctr" rtl="0" eaLnBrk="1" latinLnBrk="0" hangingPunct="1">
+              <a:spcBef>
+                <a:spcPct val="20000"/>
+              </a:spcBef>
+              <a:buClr>
+                <a:schemeClr val="accent5">
+                  <a:lumMod val="50000"/>
+                </a:schemeClr>
+              </a:buClr>
+              <a:buSzPct val="80000"/>
+              <a:buFont typeface="Wingdings 2"/>
+              <a:buNone/>
+              <a:defRPr kumimoji="0" sz="1800" kern="1200">
+                <a:solidFill>
+                  <a:schemeClr val="tx1"/>
+                </a:solidFill>
+                <a:latin typeface="+mn-lt"/>
+                <a:ea typeface="+mn-ea"/>
+                <a:cs typeface="+mn-cs"/>
+              </a:defRPr>
+            </a:lvl6pPr>
+            <a:lvl7pPr marL="2743200" indent="0" algn="ctr" rtl="0" eaLnBrk="1" latinLnBrk="0" hangingPunct="1">
+              <a:spcBef>
+                <a:spcPct val="20000"/>
+              </a:spcBef>
+              <a:buClr>
+                <a:schemeClr val="accent6">
+                  <a:lumMod val="75000"/>
+                </a:schemeClr>
+              </a:buClr>
+              <a:buSzPct val="80000"/>
+              <a:buFont typeface="Wingdings 2"/>
+              <a:buNone/>
+              <a:defRPr kumimoji="0" sz="1600" kern="1200" baseline="0">
+                <a:solidFill>
+                  <a:schemeClr val="tx1"/>
+                </a:solidFill>
+                <a:latin typeface="+mn-lt"/>
+                <a:ea typeface="+mn-ea"/>
+                <a:cs typeface="+mn-cs"/>
+              </a:defRPr>
+            </a:lvl7pPr>
+            <a:lvl8pPr marL="3200400" indent="0" algn="ctr" rtl="0" eaLnBrk="1" latinLnBrk="0" hangingPunct="1">
+              <a:spcBef>
+                <a:spcPct val="20000"/>
+              </a:spcBef>
+              <a:buClr>
+                <a:schemeClr val="tx2"/>
+              </a:buClr>
+              <a:buNone/>
+              <a:defRPr kumimoji="0" sz="1600" kern="1200">
+                <a:solidFill>
+                  <a:schemeClr val="tx1"/>
+                </a:solidFill>
+                <a:latin typeface="+mn-lt"/>
+                <a:ea typeface="+mn-ea"/>
+                <a:cs typeface="+mn-cs"/>
+              </a:defRPr>
+            </a:lvl8pPr>
+            <a:lvl9pPr marL="3657600" indent="0" algn="ctr" rtl="0" eaLnBrk="1" latinLnBrk="0" hangingPunct="1">
+              <a:spcBef>
+                <a:spcPct val="20000"/>
+              </a:spcBef>
+              <a:buClr>
+                <a:schemeClr val="tx2"/>
+              </a:buClr>
+              <a:buFontTx/>
+              <a:buNone/>
+              <a:defRPr kumimoji="0" sz="1400" kern="1200" baseline="0">
+                <a:solidFill>
+                  <a:schemeClr val="tx1"/>
+                </a:solidFill>
+                <a:latin typeface="+mn-lt"/>
+                <a:ea typeface="+mn-ea"/>
+                <a:cs typeface="+mn-cs"/>
+              </a:defRPr>
+            </a:lvl9pPr>
+          </a:lstStyle>
+          <a:p>
+            <a:pPr marL="457200" indent="-457200" algn="l">
+              <a:buFont typeface="Arial" panose="020B0604020202020204" pitchFamily="34" charset="0"/>
+              <a:buChar char="•"/>
+            </a:pPr>
+            <a:r>
+              <a:rPr lang="zh-CN" altLang="en-US" dirty="0"/>
+              <a:t>更新</a:t>
+            </a:r>
+            <a:r>
+              <a:rPr lang="en-US" altLang="zh-CN" dirty="0"/>
+              <a:t>repository page</a:t>
+            </a:r>
+          </a:p>
+          <a:p>
+            <a:pPr marL="457200" indent="-457200" algn="l">
+              <a:buFont typeface="Arial" panose="020B0604020202020204" pitchFamily="34" charset="0"/>
+              <a:buChar char="•"/>
+            </a:pPr>
+            <a:r>
+              <a:rPr lang="zh-CN" altLang="en-US" dirty="0"/>
+              <a:t>输入历代朝代结构</a:t>
+            </a:r>
+            <a:endParaRPr lang="en-US" altLang="zh-CN" dirty="0"/>
+          </a:p>
+          <a:p>
+            <a:pPr marL="457200" indent="-457200" algn="l">
+              <a:buFont typeface="Arial" panose="020B0604020202020204" pitchFamily="34" charset="0"/>
+              <a:buChar char="•"/>
+            </a:pPr>
+            <a:r>
+              <a:rPr lang="zh-CN" altLang="en-US" dirty="0"/>
+              <a:t>构建</a:t>
+            </a:r>
+            <a:r>
+              <a:rPr lang="en-US" altLang="zh-CN" dirty="0"/>
+              <a:t>《</a:t>
+            </a:r>
+            <a:r>
+              <a:rPr lang="zh-CN" altLang="en-US" dirty="0"/>
+              <a:t>本草纲目</a:t>
+            </a:r>
+            <a:r>
+              <a:rPr lang="en-US" altLang="zh-CN" dirty="0"/>
+              <a:t>》</a:t>
+            </a:r>
+            <a:r>
+              <a:rPr lang="zh-CN" altLang="en-US" dirty="0"/>
+              <a:t>药品</a:t>
+            </a:r>
+            <a:r>
+              <a:rPr lang="en-US" altLang="zh-CN" dirty="0"/>
+              <a:t>class</a:t>
+            </a:r>
+            <a:r>
+              <a:rPr lang="zh-CN" altLang="en-US" dirty="0"/>
+              <a:t>结构，与</a:t>
+            </a:r>
+            <a:r>
+              <a:rPr lang="en-US" altLang="zh-CN" dirty="0"/>
+              <a:t>《</a:t>
+            </a:r>
+            <a:r>
+              <a:rPr lang="zh-CN" altLang="en-US" dirty="0"/>
+              <a:t>神农本草经</a:t>
+            </a:r>
+            <a:r>
+              <a:rPr lang="en-US" altLang="zh-CN" dirty="0"/>
+              <a:t>》cross reference</a:t>
+            </a:r>
+          </a:p>
+          <a:p>
+            <a:pPr marL="457200" indent="-457200" algn="l">
+              <a:buFont typeface="Arial" panose="020B0604020202020204" pitchFamily="34" charset="0"/>
+              <a:buChar char="•"/>
+            </a:pPr>
+            <a:r>
+              <a:rPr lang="zh-CN" altLang="en-US" dirty="0"/>
+              <a:t>用</a:t>
+            </a:r>
+            <a:r>
+              <a:rPr lang="en-US" altLang="zh-CN" dirty="0"/>
+              <a:t>DL Query</a:t>
+            </a:r>
+            <a:r>
+              <a:rPr lang="zh-CN" altLang="en-US" dirty="0"/>
+              <a:t>检视</a:t>
+            </a:r>
+            <a:r>
+              <a:rPr lang="en-US" altLang="zh-CN" dirty="0"/>
+              <a:t>ontology</a:t>
+            </a:r>
+            <a:endParaRPr lang="en-US" dirty="0"/>
+          </a:p>
+        </p:txBody>
+      </p:sp>
+    </p:spTree>
+    <p:extLst>
+      <p:ext uri="{BB962C8B-B14F-4D97-AF65-F5344CB8AC3E}">
+        <p14:creationId xmlns:p14="http://schemas.microsoft.com/office/powerpoint/2010/main" val="4075622419"/>
       </p:ext>
     </p:extLst>
   </p:cSld>

</xml_diff>

<commit_message>
prepare Chinese_Prescription Ontoloty (003)
</commit_message>
<xml_diff>
--- a/使用Protégé建立中国传统医学本体模型.pptx
+++ b/使用Protégé建立中国传统医学本体模型.pptx
@@ -5,12 +5,13 @@
     <p:sldMasterId id="2147483684" r:id="rId1"/>
   </p:sldMasterIdLst>
   <p:notesMasterIdLst>
-    <p:notesMasterId r:id="rId5"/>
+    <p:notesMasterId r:id="rId6"/>
   </p:notesMasterIdLst>
   <p:sldIdLst>
     <p:sldId id="272" r:id="rId2"/>
     <p:sldId id="273" r:id="rId3"/>
     <p:sldId id="274" r:id="rId4"/>
+    <p:sldId id="275" r:id="rId5"/>
   </p:sldIdLst>
   <p:sldSz cx="12192000" cy="6858000"/>
   <p:notesSz cx="6858000" cy="9144000"/>
@@ -199,7 +200,7 @@
           <a:p>
             <a:fld id="{71BD4573-58E7-4156-A133-2731F5F8D1A6}" type="datetimeFigureOut">
               <a:rPr lang="en-US" smtClean="0"/>
-              <a:t>11/26/2023</a:t>
+              <a:t>12/22/2023</a:t>
             </a:fld>
             <a:endParaRPr lang="en-US"/>
           </a:p>
@@ -625,6 +626,90 @@
     <p:extLst>
       <p:ext uri="{BB962C8B-B14F-4D97-AF65-F5344CB8AC3E}">
         <p14:creationId xmlns:p14="http://schemas.microsoft.com/office/powerpoint/2010/main" val="1017453790"/>
+      </p:ext>
+    </p:extLst>
+  </p:cSld>
+  <p:clrMapOvr>
+    <a:masterClrMapping/>
+  </p:clrMapOvr>
+</p:notes>
+</file>
+
+<file path=ppt/notesSlides/notesSlide3.xml><?xml version="1.0" encoding="utf-8"?>
+<p:notes xmlns:a="http://schemas.openxmlformats.org/drawingml/2006/main" xmlns:r="http://schemas.openxmlformats.org/officeDocument/2006/relationships" xmlns:p="http://schemas.openxmlformats.org/presentationml/2006/main">
+  <p:cSld>
+    <p:spTree>
+      <p:nvGrpSpPr>
+        <p:cNvPr id="1" name=""/>
+        <p:cNvGrpSpPr/>
+        <p:nvPr/>
+      </p:nvGrpSpPr>
+      <p:grpSpPr>
+        <a:xfrm>
+          <a:off x="0" y="0"/>
+          <a:ext cx="0" cy="0"/>
+          <a:chOff x="0" y="0"/>
+          <a:chExt cx="0" cy="0"/>
+        </a:xfrm>
+      </p:grpSpPr>
+      <p:sp>
+        <p:nvSpPr>
+          <p:cNvPr id="2" name="Slide Image Placeholder 1"/>
+          <p:cNvSpPr>
+            <a:spLocks noGrp="1" noRot="1" noChangeAspect="1"/>
+          </p:cNvSpPr>
+          <p:nvPr>
+            <p:ph type="sldImg"/>
+          </p:nvPr>
+        </p:nvSpPr>
+        <p:spPr/>
+      </p:sp>
+      <p:sp>
+        <p:nvSpPr>
+          <p:cNvPr id="3" name="Notes Placeholder 2"/>
+          <p:cNvSpPr>
+            <a:spLocks noGrp="1"/>
+          </p:cNvSpPr>
+          <p:nvPr>
+            <p:ph type="body" idx="1"/>
+          </p:nvPr>
+        </p:nvSpPr>
+        <p:spPr/>
+        <p:txBody>
+          <a:bodyPr/>
+          <a:lstStyle/>
+          <a:p>
+            <a:endParaRPr lang="en-US"/>
+          </a:p>
+        </p:txBody>
+      </p:sp>
+      <p:sp>
+        <p:nvSpPr>
+          <p:cNvPr id="4" name="Slide Number Placeholder 3"/>
+          <p:cNvSpPr>
+            <a:spLocks noGrp="1"/>
+          </p:cNvSpPr>
+          <p:nvPr>
+            <p:ph type="sldNum" sz="quarter" idx="10"/>
+          </p:nvPr>
+        </p:nvSpPr>
+        <p:spPr/>
+        <p:txBody>
+          <a:bodyPr/>
+          <a:lstStyle/>
+          <a:p>
+            <a:fld id="{893B0CF2-7F87-4E02-A248-870047730F99}" type="slidenum">
+              <a:rPr lang="en-US" smtClean="0"/>
+              <a:t>4</a:t>
+            </a:fld>
+            <a:endParaRPr lang="en-US"/>
+          </a:p>
+        </p:txBody>
+      </p:sp>
+    </p:spTree>
+    <p:extLst>
+      <p:ext uri="{BB962C8B-B14F-4D97-AF65-F5344CB8AC3E}">
+        <p14:creationId xmlns:p14="http://schemas.microsoft.com/office/powerpoint/2010/main" val="2330383356"/>
       </p:ext>
     </p:extLst>
   </p:cSld>
@@ -948,7 +1033,7 @@
           <a:p>
             <a:fld id="{021A1D30-C0A0-4124-A783-34D9F15FA0FE}" type="datetime1">
               <a:rPr lang="en-US" smtClean="0"/>
-              <a:t>11/26/2023</a:t>
+              <a:t>12/22/2023</a:t>
             </a:fld>
             <a:endParaRPr lang="en-US"/>
           </a:p>
@@ -1132,7 +1217,7 @@
           <a:p>
             <a:fld id="{8D2D5871-AB0F-4B3D-8861-97E78CB7B47E}" type="datetime1">
               <a:rPr lang="en-US" smtClean="0"/>
-              <a:t>11/26/2023</a:t>
+              <a:t>12/22/2023</a:t>
             </a:fld>
             <a:endParaRPr lang="en-US"/>
           </a:p>
@@ -1326,7 +1411,7 @@
           <a:p>
             <a:fld id="{14418406-4C3F-4F3E-80BD-A22568EA37EB}" type="datetime1">
               <a:rPr lang="en-US" smtClean="0"/>
-              <a:t>11/26/2023</a:t>
+              <a:t>12/22/2023</a:t>
             </a:fld>
             <a:endParaRPr lang="en-US"/>
           </a:p>
@@ -1510,7 +1595,7 @@
           <a:p>
             <a:fld id="{65F28077-7188-48C5-8679-2287FAC952E9}" type="datetime1">
               <a:rPr lang="en-US" smtClean="0"/>
-              <a:t>11/26/2023</a:t>
+              <a:t>12/22/2023</a:t>
             </a:fld>
             <a:endParaRPr lang="en-US"/>
           </a:p>
@@ -1757,7 +1842,7 @@
           <a:p>
             <a:fld id="{D2DCB740-6776-4EE9-99FD-96D592FA5A23}" type="datetime1">
               <a:rPr lang="en-US" smtClean="0"/>
-              <a:t>11/26/2023</a:t>
+              <a:t>12/22/2023</a:t>
             </a:fld>
             <a:endParaRPr lang="en-US"/>
           </a:p>
@@ -2040,7 +2125,7 @@
           <a:p>
             <a:fld id="{05F6BD99-6FFD-46C5-B5E2-43A34BDA2566}" type="datetime1">
               <a:rPr lang="en-US" smtClean="0"/>
-              <a:t>11/26/2023</a:t>
+              <a:t>12/22/2023</a:t>
             </a:fld>
             <a:endParaRPr lang="en-US"/>
           </a:p>
@@ -2437,7 +2522,7 @@
           <a:p>
             <a:fld id="{E022678E-214C-4CF8-97C7-95015FB02960}" type="datetime1">
               <a:rPr lang="en-US" smtClean="0"/>
-              <a:t>11/26/2023</a:t>
+              <a:t>12/22/2023</a:t>
             </a:fld>
             <a:endParaRPr lang="en-US"/>
           </a:p>
@@ -2606,7 +2691,7 @@
           <a:p>
             <a:fld id="{D55660E0-FA77-4473-A859-74127B089143}" type="datetime1">
               <a:rPr lang="en-US" smtClean="0"/>
-              <a:t>11/26/2023</a:t>
+              <a:t>12/22/2023</a:t>
             </a:fld>
             <a:endParaRPr lang="en-US"/>
           </a:p>
@@ -2716,7 +2801,7 @@
           <a:p>
             <a:fld id="{3188D7B8-9F07-4899-827D-5F3CFDDEB574}" type="datetime1">
               <a:rPr lang="en-US" smtClean="0"/>
-              <a:t>11/26/2023</a:t>
+              <a:t>12/22/2023</a:t>
             </a:fld>
             <a:endParaRPr lang="en-US"/>
           </a:p>
@@ -2996,7 +3081,7 @@
           <a:p>
             <a:fld id="{B5197C5C-1CD1-417D-A89C-14747F5222C7}" type="datetime1">
               <a:rPr lang="en-US" smtClean="0"/>
-              <a:t>11/26/2023</a:t>
+              <a:t>12/22/2023</a:t>
             </a:fld>
             <a:endParaRPr lang="en-US"/>
           </a:p>
@@ -3349,7 +3434,7 @@
           <a:p>
             <a:fld id="{1359EFBB-CFA1-4AA8-9123-F0B52DBD84FE}" type="datetime1">
               <a:rPr lang="en-US" smtClean="0"/>
-              <a:t>11/26/2023</a:t>
+              <a:t>12/22/2023</a:t>
             </a:fld>
             <a:endParaRPr lang="en-US"/>
           </a:p>
@@ -4383,7 +4468,7 @@
             <a:fld id="{61146459-E3C3-4969-9224-5ED50B492D17}" type="datetime1">
               <a:rPr lang="en-US" smtClean="0"/>
               <a:pPr/>
-              <a:t>11/26/2023</a:t>
+              <a:t>12/22/2023</a:t>
             </a:fld>
             <a:endParaRPr lang="en-US" dirty="0"/>
           </a:p>
@@ -5885,6 +5970,525 @@
     <p:extLst>
       <p:ext uri="{BB962C8B-B14F-4D97-AF65-F5344CB8AC3E}">
         <p14:creationId xmlns:p14="http://schemas.microsoft.com/office/powerpoint/2010/main" val="4075622419"/>
+      </p:ext>
+    </p:extLst>
+  </p:cSld>
+  <p:clrMapOvr>
+    <a:masterClrMapping/>
+  </p:clrMapOvr>
+  <mc:AlternateContent xmlns:mc="http://schemas.openxmlformats.org/markup-compatibility/2006" xmlns:p14="http://schemas.microsoft.com/office/powerpoint/2010/main">
+    <mc:Choice Requires="p14">
+      <p:transition spd="med" p14:dur="700">
+        <p:fade/>
+      </p:transition>
+    </mc:Choice>
+    <mc:Fallback xmlns="">
+      <p:transition spd="med">
+        <p:fade/>
+      </p:transition>
+    </mc:Fallback>
+  </mc:AlternateContent>
+</p:sld>
+</file>
+
+<file path=ppt/slides/slide4.xml><?xml version="1.0" encoding="utf-8"?>
+<p:sld xmlns:a="http://schemas.openxmlformats.org/drawingml/2006/main" xmlns:r="http://schemas.openxmlformats.org/officeDocument/2006/relationships" xmlns:p="http://schemas.openxmlformats.org/presentationml/2006/main">
+  <p:cSld>
+    <p:spTree>
+      <p:nvGrpSpPr>
+        <p:cNvPr id="1" name=""/>
+        <p:cNvGrpSpPr/>
+        <p:nvPr/>
+      </p:nvGrpSpPr>
+      <p:grpSpPr>
+        <a:xfrm>
+          <a:off x="0" y="0"/>
+          <a:ext cx="0" cy="0"/>
+          <a:chOff x="0" y="0"/>
+          <a:chExt cx="0" cy="0"/>
+        </a:xfrm>
+      </p:grpSpPr>
+      <p:sp>
+        <p:nvSpPr>
+          <p:cNvPr id="4" name="Title 3"/>
+          <p:cNvSpPr>
+            <a:spLocks noGrp="1"/>
+          </p:cNvSpPr>
+          <p:nvPr>
+            <p:ph type="ctrTitle"/>
+          </p:nvPr>
+        </p:nvSpPr>
+        <p:spPr>
+          <a:xfrm>
+            <a:off x="715264" y="349246"/>
+            <a:ext cx="10468864" cy="1828800"/>
+          </a:xfrm>
+        </p:spPr>
+        <p:txBody>
+          <a:bodyPr>
+            <a:normAutofit/>
+          </a:bodyPr>
+          <a:lstStyle/>
+          <a:p>
+            <a:r>
+              <a:rPr lang="zh-CN" altLang="en-US" sz="4400" dirty="0"/>
+              <a:t>使用</a:t>
+            </a:r>
+            <a:r>
+              <a:rPr lang="en-US" altLang="zh-CN" sz="4400" dirty="0"/>
+              <a:t>Protégé</a:t>
+            </a:r>
+            <a:r>
+              <a:rPr lang="zh-CN" altLang="en-US" sz="4400" dirty="0"/>
+              <a:t>建立中国传统医学本体模型</a:t>
+            </a:r>
+            <a:r>
+              <a:rPr lang="en-US" altLang="zh-CN" sz="4400" dirty="0"/>
+              <a:t>Ontology - 003</a:t>
+            </a:r>
+            <a:endParaRPr lang="en-US" sz="4400" dirty="0"/>
+          </a:p>
+        </p:txBody>
+      </p:sp>
+      <p:sp>
+        <p:nvSpPr>
+          <p:cNvPr id="5" name="Subtitle 4"/>
+          <p:cNvSpPr>
+            <a:spLocks noGrp="1"/>
+          </p:cNvSpPr>
+          <p:nvPr>
+            <p:ph type="subTitle" idx="1"/>
+          </p:nvPr>
+        </p:nvSpPr>
+        <p:spPr>
+          <a:xfrm>
+            <a:off x="9215718" y="5465590"/>
+            <a:ext cx="1968410" cy="498783"/>
+          </a:xfrm>
+        </p:spPr>
+        <p:txBody>
+          <a:bodyPr/>
+          <a:lstStyle/>
+          <a:p>
+            <a:r>
+              <a:rPr lang="en-US" dirty="0"/>
+              <a:t>Xiaoqi Zhao</a:t>
+            </a:r>
+          </a:p>
+          <a:p>
+            <a:endParaRPr lang="en-US" dirty="0"/>
+          </a:p>
+        </p:txBody>
+      </p:sp>
+      <p:sp>
+        <p:nvSpPr>
+          <p:cNvPr id="2" name="TextBox 1">
+            <a:extLst>
+              <a:ext uri="{FF2B5EF4-FFF2-40B4-BE49-F238E27FC236}">
+                <a16:creationId xmlns:a16="http://schemas.microsoft.com/office/drawing/2014/main" id="{73A66BBE-F179-5F48-8051-3672205AD659}"/>
+              </a:ext>
+            </a:extLst>
+          </p:cNvPr>
+          <p:cNvSpPr txBox="1"/>
+          <p:nvPr/>
+        </p:nvSpPr>
+        <p:spPr>
+          <a:xfrm>
+            <a:off x="1255058" y="5253317"/>
+            <a:ext cx="5800178" cy="923330"/>
+          </a:xfrm>
+          <a:prstGeom prst="rect">
+            <a:avLst/>
+          </a:prstGeom>
+          <a:solidFill>
+            <a:schemeClr val="accent3">
+              <a:lumMod val="20000"/>
+              <a:lumOff val="80000"/>
+            </a:schemeClr>
+          </a:solidFill>
+          <a:ln>
+            <a:solidFill>
+              <a:schemeClr val="bg2"/>
+            </a:solidFill>
+          </a:ln>
+        </p:spPr>
+        <p:txBody>
+          <a:bodyPr wrap="none" rtlCol="0">
+            <a:spAutoFit/>
+          </a:bodyPr>
+          <a:lstStyle/>
+          <a:p>
+            <a:r>
+              <a:rPr lang="en-US" dirty="0"/>
+              <a:t>GitHub: </a:t>
+            </a:r>
+            <a:r>
+              <a:rPr lang="en-US" dirty="0">
+                <a:hlinkClick r:id="rId3"/>
+              </a:rPr>
+              <a:t>https://github.com/yasenstar/Chinese_Culture</a:t>
+            </a:r>
+            <a:endParaRPr lang="en-US" dirty="0"/>
+          </a:p>
+          <a:p>
+            <a:endParaRPr lang="en-US" dirty="0"/>
+          </a:p>
+          <a:p>
+            <a:r>
+              <a:rPr lang="en-US" dirty="0"/>
+              <a:t>Gitee: </a:t>
+            </a:r>
+            <a:r>
+              <a:rPr lang="en-US" dirty="0">
+                <a:hlinkClick r:id="rId4"/>
+              </a:rPr>
+              <a:t>https://gitee.com/yasenstar/Chinese_Culture</a:t>
+            </a:r>
+            <a:endParaRPr lang="en-US" dirty="0"/>
+          </a:p>
+        </p:txBody>
+      </p:sp>
+      <p:sp>
+        <p:nvSpPr>
+          <p:cNvPr id="3" name="Subtitle 4">
+            <a:extLst>
+              <a:ext uri="{FF2B5EF4-FFF2-40B4-BE49-F238E27FC236}">
+                <a16:creationId xmlns:a16="http://schemas.microsoft.com/office/drawing/2014/main" id="{D39D7665-E3EE-818A-A445-2B1DE66F9A46}"/>
+              </a:ext>
+            </a:extLst>
+          </p:cNvPr>
+          <p:cNvSpPr txBox="1">
+            <a:spLocks/>
+          </p:cNvSpPr>
+          <p:nvPr/>
+        </p:nvSpPr>
+        <p:spPr>
+          <a:xfrm>
+            <a:off x="1443317" y="1928654"/>
+            <a:ext cx="5988423" cy="2751301"/>
+          </a:xfrm>
+          <a:prstGeom prst="rect">
+            <a:avLst/>
+          </a:prstGeom>
+        </p:spPr>
+        <p:txBody>
+          <a:bodyPr vert="horz" lIns="0" rIns="18288">
+            <a:normAutofit/>
+          </a:bodyPr>
+          <a:lstStyle>
+            <a:lvl1pPr marL="0" marR="45720" indent="0" algn="r" rtl="0" eaLnBrk="1" latinLnBrk="0" hangingPunct="1">
+              <a:spcBef>
+                <a:spcPct val="20000"/>
+              </a:spcBef>
+              <a:buClr>
+                <a:schemeClr val="accent3">
+                  <a:lumMod val="50000"/>
+                </a:schemeClr>
+              </a:buClr>
+              <a:buSzPct val="95000"/>
+              <a:buFont typeface="Wingdings 2"/>
+              <a:buNone/>
+              <a:defRPr kumimoji="0" sz="2600" kern="1200">
+                <a:solidFill>
+                  <a:schemeClr val="tx1"/>
+                </a:solidFill>
+                <a:latin typeface="+mn-lt"/>
+                <a:ea typeface="+mn-ea"/>
+                <a:cs typeface="+mn-cs"/>
+              </a:defRPr>
+            </a:lvl1pPr>
+            <a:lvl2pPr marL="457200" indent="0" algn="ctr" rtl="0" eaLnBrk="1" latinLnBrk="0" hangingPunct="1">
+              <a:spcBef>
+                <a:spcPct val="20000"/>
+              </a:spcBef>
+              <a:buClr>
+                <a:schemeClr val="accent1">
+                  <a:lumMod val="50000"/>
+                </a:schemeClr>
+              </a:buClr>
+              <a:buSzPct val="85000"/>
+              <a:buFont typeface="Wingdings 2"/>
+              <a:buNone/>
+              <a:defRPr kumimoji="0" sz="2400" kern="1200">
+                <a:solidFill>
+                  <a:schemeClr val="tx1"/>
+                </a:solidFill>
+                <a:latin typeface="+mn-lt"/>
+                <a:ea typeface="+mn-ea"/>
+                <a:cs typeface="+mn-cs"/>
+              </a:defRPr>
+            </a:lvl2pPr>
+            <a:lvl3pPr marL="914400" indent="0" algn="ctr" rtl="0" eaLnBrk="1" latinLnBrk="0" hangingPunct="1">
+              <a:spcBef>
+                <a:spcPct val="20000"/>
+              </a:spcBef>
+              <a:buClr>
+                <a:schemeClr val="accent2">
+                  <a:lumMod val="50000"/>
+                </a:schemeClr>
+              </a:buClr>
+              <a:buSzPct val="70000"/>
+              <a:buFont typeface="Wingdings 2"/>
+              <a:buNone/>
+              <a:defRPr kumimoji="0" sz="2100" kern="1200">
+                <a:solidFill>
+                  <a:schemeClr val="tx1"/>
+                </a:solidFill>
+                <a:latin typeface="+mn-lt"/>
+                <a:ea typeface="+mn-ea"/>
+                <a:cs typeface="+mn-cs"/>
+              </a:defRPr>
+            </a:lvl3pPr>
+            <a:lvl4pPr marL="1371600" indent="0" algn="ctr" rtl="0" eaLnBrk="1" latinLnBrk="0" hangingPunct="1">
+              <a:spcBef>
+                <a:spcPct val="20000"/>
+              </a:spcBef>
+              <a:buClr>
+                <a:schemeClr val="accent3">
+                  <a:lumMod val="50000"/>
+                </a:schemeClr>
+              </a:buClr>
+              <a:buSzPct val="65000"/>
+              <a:buFont typeface="Wingdings 2"/>
+              <a:buNone/>
+              <a:defRPr kumimoji="0" sz="2000" kern="1200">
+                <a:solidFill>
+                  <a:schemeClr val="tx1"/>
+                </a:solidFill>
+                <a:latin typeface="+mn-lt"/>
+                <a:ea typeface="+mn-ea"/>
+                <a:cs typeface="+mn-cs"/>
+              </a:defRPr>
+            </a:lvl4pPr>
+            <a:lvl5pPr marL="1828800" indent="0" algn="ctr" rtl="0" eaLnBrk="1" latinLnBrk="0" hangingPunct="1">
+              <a:spcBef>
+                <a:spcPct val="20000"/>
+              </a:spcBef>
+              <a:buClr>
+                <a:schemeClr val="accent4">
+                  <a:lumMod val="75000"/>
+                </a:schemeClr>
+              </a:buClr>
+              <a:buSzPct val="65000"/>
+              <a:buFont typeface="Wingdings 2"/>
+              <a:buNone/>
+              <a:defRPr kumimoji="0" sz="2000" kern="1200">
+                <a:solidFill>
+                  <a:schemeClr val="tx1"/>
+                </a:solidFill>
+                <a:latin typeface="+mn-lt"/>
+                <a:ea typeface="+mn-ea"/>
+                <a:cs typeface="+mn-cs"/>
+              </a:defRPr>
+            </a:lvl5pPr>
+            <a:lvl6pPr marL="2286000" indent="0" algn="ctr" rtl="0" eaLnBrk="1" latinLnBrk="0" hangingPunct="1">
+              <a:spcBef>
+                <a:spcPct val="20000"/>
+              </a:spcBef>
+              <a:buClr>
+                <a:schemeClr val="accent5">
+                  <a:lumMod val="50000"/>
+                </a:schemeClr>
+              </a:buClr>
+              <a:buSzPct val="80000"/>
+              <a:buFont typeface="Wingdings 2"/>
+              <a:buNone/>
+              <a:defRPr kumimoji="0" sz="1800" kern="1200">
+                <a:solidFill>
+                  <a:schemeClr val="tx1"/>
+                </a:solidFill>
+                <a:latin typeface="+mn-lt"/>
+                <a:ea typeface="+mn-ea"/>
+                <a:cs typeface="+mn-cs"/>
+              </a:defRPr>
+            </a:lvl6pPr>
+            <a:lvl7pPr marL="2743200" indent="0" algn="ctr" rtl="0" eaLnBrk="1" latinLnBrk="0" hangingPunct="1">
+              <a:spcBef>
+                <a:spcPct val="20000"/>
+              </a:spcBef>
+              <a:buClr>
+                <a:schemeClr val="accent6">
+                  <a:lumMod val="75000"/>
+                </a:schemeClr>
+              </a:buClr>
+              <a:buSzPct val="80000"/>
+              <a:buFont typeface="Wingdings 2"/>
+              <a:buNone/>
+              <a:defRPr kumimoji="0" sz="1600" kern="1200" baseline="0">
+                <a:solidFill>
+                  <a:schemeClr val="tx1"/>
+                </a:solidFill>
+                <a:latin typeface="+mn-lt"/>
+                <a:ea typeface="+mn-ea"/>
+                <a:cs typeface="+mn-cs"/>
+              </a:defRPr>
+            </a:lvl7pPr>
+            <a:lvl8pPr marL="3200400" indent="0" algn="ctr" rtl="0" eaLnBrk="1" latinLnBrk="0" hangingPunct="1">
+              <a:spcBef>
+                <a:spcPct val="20000"/>
+              </a:spcBef>
+              <a:buClr>
+                <a:schemeClr val="tx2"/>
+              </a:buClr>
+              <a:buNone/>
+              <a:defRPr kumimoji="0" sz="1600" kern="1200">
+                <a:solidFill>
+                  <a:schemeClr val="tx1"/>
+                </a:solidFill>
+                <a:latin typeface="+mn-lt"/>
+                <a:ea typeface="+mn-ea"/>
+                <a:cs typeface="+mn-cs"/>
+              </a:defRPr>
+            </a:lvl8pPr>
+            <a:lvl9pPr marL="3657600" indent="0" algn="ctr" rtl="0" eaLnBrk="1" latinLnBrk="0" hangingPunct="1">
+              <a:spcBef>
+                <a:spcPct val="20000"/>
+              </a:spcBef>
+              <a:buClr>
+                <a:schemeClr val="tx2"/>
+              </a:buClr>
+              <a:buFontTx/>
+              <a:buNone/>
+              <a:defRPr kumimoji="0" sz="1400" kern="1200" baseline="0">
+                <a:solidFill>
+                  <a:schemeClr val="tx1"/>
+                </a:solidFill>
+                <a:latin typeface="+mn-lt"/>
+                <a:ea typeface="+mn-ea"/>
+                <a:cs typeface="+mn-cs"/>
+              </a:defRPr>
+            </a:lvl9pPr>
+          </a:lstStyle>
+          <a:p>
+            <a:pPr marL="457200" indent="-457200" algn="l">
+              <a:buFont typeface="Arial" panose="020B0604020202020204" pitchFamily="34" charset="0"/>
+              <a:buChar char="•"/>
+            </a:pPr>
+            <a:r>
+              <a:rPr lang="zh-CN" altLang="en-US" dirty="0"/>
+              <a:t>整合代码信息仓库</a:t>
+            </a:r>
+            <a:endParaRPr lang="en-US" altLang="zh-CN" dirty="0"/>
+          </a:p>
+          <a:p>
+            <a:pPr marL="457200" indent="-457200" algn="l">
+              <a:buFont typeface="Arial" panose="020B0604020202020204" pitchFamily="34" charset="0"/>
+              <a:buChar char="•"/>
+            </a:pPr>
+            <a:r>
+              <a:rPr lang="zh-CN" altLang="en-US" dirty="0"/>
+              <a:t>本体模型化整为零</a:t>
+            </a:r>
+            <a:endParaRPr lang="en-US" altLang="zh-CN" dirty="0"/>
+          </a:p>
+          <a:p>
+            <a:pPr marL="457200" indent="-457200" algn="l">
+              <a:buFont typeface="Arial" panose="020B0604020202020204" pitchFamily="34" charset="0"/>
+              <a:buChar char="•"/>
+            </a:pPr>
+            <a:r>
+              <a:rPr lang="zh-CN" altLang="en-US" dirty="0"/>
+              <a:t>从</a:t>
+            </a:r>
+            <a:r>
+              <a:rPr lang="en-US" altLang="zh-CN" dirty="0"/>
+              <a:t>《</a:t>
+            </a:r>
+            <a:r>
+              <a:rPr lang="zh-CN" altLang="en-US" dirty="0"/>
+              <a:t>方剂学</a:t>
+            </a:r>
+            <a:r>
+              <a:rPr lang="en-US" altLang="zh-CN" dirty="0"/>
+              <a:t>》</a:t>
+            </a:r>
+            <a:r>
+              <a:rPr lang="zh-CN" altLang="en-US" dirty="0"/>
+              <a:t>探讨方剂</a:t>
+            </a:r>
+            <a:r>
+              <a:rPr lang="en-US" altLang="zh-CN" dirty="0"/>
+              <a:t>-</a:t>
+            </a:r>
+            <a:r>
+              <a:rPr lang="zh-CN" altLang="en-US" dirty="0"/>
+              <a:t>药材</a:t>
+            </a:r>
+            <a:r>
+              <a:rPr lang="en-US" altLang="zh-CN" dirty="0"/>
+              <a:t>-</a:t>
+            </a:r>
+            <a:r>
+              <a:rPr lang="zh-CN" altLang="en-US" dirty="0"/>
+              <a:t>药量与出处之间的本体元素选择与关系</a:t>
+            </a:r>
+            <a:endParaRPr lang="en-US" altLang="zh-CN" dirty="0"/>
+          </a:p>
+          <a:p>
+            <a:pPr marL="457200" indent="-457200" algn="l">
+              <a:buFont typeface="Arial" panose="020B0604020202020204" pitchFamily="34" charset="0"/>
+              <a:buChar char="•"/>
+            </a:pPr>
+            <a:r>
+              <a:rPr lang="zh-CN" altLang="en-US" dirty="0"/>
+              <a:t>初步建立</a:t>
+            </a:r>
+            <a:r>
+              <a:rPr lang="en-US" altLang="zh-CN" dirty="0" err="1"/>
+              <a:t>chinese_prescription</a:t>
+            </a:r>
+            <a:r>
+              <a:rPr lang="zh-CN" altLang="en-US" dirty="0"/>
+              <a:t>本体</a:t>
+            </a:r>
+            <a:endParaRPr lang="en-US" dirty="0"/>
+          </a:p>
+        </p:txBody>
+      </p:sp>
+      <p:pic>
+        <p:nvPicPr>
+          <p:cNvPr id="7" name="Picture 6">
+            <a:extLst>
+              <a:ext uri="{FF2B5EF4-FFF2-40B4-BE49-F238E27FC236}">
+                <a16:creationId xmlns:a16="http://schemas.microsoft.com/office/drawing/2014/main" id="{CEB2E521-A50B-3476-CFF5-47FAFE74675B}"/>
+              </a:ext>
+            </a:extLst>
+          </p:cNvPr>
+          <p:cNvPicPr>
+            <a:picLocks noChangeAspect="1"/>
+          </p:cNvPicPr>
+          <p:nvPr/>
+        </p:nvPicPr>
+        <p:blipFill>
+          <a:blip r:embed="rId5"/>
+          <a:stretch>
+            <a:fillRect/>
+          </a:stretch>
+        </p:blipFill>
+        <p:spPr>
+          <a:xfrm>
+            <a:off x="7893703" y="2293284"/>
+            <a:ext cx="1819275" cy="2647950"/>
+          </a:xfrm>
+          <a:prstGeom prst="rect">
+            <a:avLst/>
+          </a:prstGeom>
+          <a:ln>
+            <a:noFill/>
+          </a:ln>
+          <a:effectLst>
+            <a:outerShdw blurRad="292100" dist="139700" dir="2700000" algn="tl" rotWithShape="0">
+              <a:srgbClr val="333333">
+                <a:alpha val="65000"/>
+              </a:srgbClr>
+            </a:outerShdw>
+          </a:effectLst>
+        </p:spPr>
+      </p:pic>
+    </p:spTree>
+    <p:extLst>
+      <p:ext uri="{BB962C8B-B14F-4D97-AF65-F5344CB8AC3E}">
+        <p14:creationId xmlns:p14="http://schemas.microsoft.com/office/powerpoint/2010/main" val="3945277815"/>
       </p:ext>
     </p:extLst>
   </p:cSld>

</xml_diff>

<commit_message>
add 006 and update cn-medo
</commit_message>
<xml_diff>
--- a/使用Protégé建立中国传统医学本体模型.pptx
+++ b/使用Protégé建立中国传统医学本体模型.pptx
@@ -5,7 +5,7 @@
     <p:sldMasterId id="2147483684" r:id="rId1"/>
   </p:sldMasterIdLst>
   <p:notesMasterIdLst>
-    <p:notesMasterId r:id="rId8"/>
+    <p:notesMasterId r:id="rId9"/>
   </p:notesMasterIdLst>
   <p:sldIdLst>
     <p:sldId id="272" r:id="rId2"/>
@@ -14,6 +14,7 @@
     <p:sldId id="275" r:id="rId5"/>
     <p:sldId id="276" r:id="rId6"/>
     <p:sldId id="277" r:id="rId7"/>
+    <p:sldId id="278" r:id="rId8"/>
   </p:sldIdLst>
   <p:sldSz cx="12192000" cy="6858000"/>
   <p:notesSz cx="6858000" cy="9144000"/>
@@ -928,6 +929,114 @@
     <p:extLst>
       <p:ext uri="{BB962C8B-B14F-4D97-AF65-F5344CB8AC3E}">
         <p14:creationId xmlns:p14="http://schemas.microsoft.com/office/powerpoint/2010/main" val="700696170"/>
+      </p:ext>
+    </p:extLst>
+  </p:cSld>
+  <p:clrMapOvr>
+    <a:masterClrMapping/>
+  </p:clrMapOvr>
+</p:notes>
+</file>
+
+<file path=ppt/notesSlides/notesSlide6.xml><?xml version="1.0" encoding="utf-8"?>
+<p:notes xmlns:a="http://schemas.openxmlformats.org/drawingml/2006/main" xmlns:r="http://schemas.openxmlformats.org/officeDocument/2006/relationships" xmlns:p="http://schemas.openxmlformats.org/presentationml/2006/main">
+  <p:cSld>
+    <p:spTree>
+      <p:nvGrpSpPr>
+        <p:cNvPr id="1" name="">
+          <a:extLst>
+            <a:ext uri="{FF2B5EF4-FFF2-40B4-BE49-F238E27FC236}">
+              <a16:creationId xmlns:a16="http://schemas.microsoft.com/office/drawing/2014/main" id="{B563666C-A6D2-06F0-DE6C-4A6BE83965DF}"/>
+            </a:ext>
+          </a:extLst>
+        </p:cNvPr>
+        <p:cNvGrpSpPr/>
+        <p:nvPr/>
+      </p:nvGrpSpPr>
+      <p:grpSpPr>
+        <a:xfrm>
+          <a:off x="0" y="0"/>
+          <a:ext cx="0" cy="0"/>
+          <a:chOff x="0" y="0"/>
+          <a:chExt cx="0" cy="0"/>
+        </a:xfrm>
+      </p:grpSpPr>
+      <p:sp>
+        <p:nvSpPr>
+          <p:cNvPr id="2" name="Slide Image Placeholder 1">
+            <a:extLst>
+              <a:ext uri="{FF2B5EF4-FFF2-40B4-BE49-F238E27FC236}">
+                <a16:creationId xmlns:a16="http://schemas.microsoft.com/office/drawing/2014/main" id="{9DCE7F3B-4A5B-D20B-E485-E99AA07F57E2}"/>
+              </a:ext>
+            </a:extLst>
+          </p:cNvPr>
+          <p:cNvSpPr>
+            <a:spLocks noGrp="1" noRot="1" noChangeAspect="1"/>
+          </p:cNvSpPr>
+          <p:nvPr>
+            <p:ph type="sldImg"/>
+          </p:nvPr>
+        </p:nvSpPr>
+        <p:spPr/>
+      </p:sp>
+      <p:sp>
+        <p:nvSpPr>
+          <p:cNvPr id="3" name="Notes Placeholder 2">
+            <a:extLst>
+              <a:ext uri="{FF2B5EF4-FFF2-40B4-BE49-F238E27FC236}">
+                <a16:creationId xmlns:a16="http://schemas.microsoft.com/office/drawing/2014/main" id="{EF6E8193-9EF9-C8CB-8BDB-170D316DC156}"/>
+              </a:ext>
+            </a:extLst>
+          </p:cNvPr>
+          <p:cNvSpPr>
+            <a:spLocks noGrp="1"/>
+          </p:cNvSpPr>
+          <p:nvPr>
+            <p:ph type="body" idx="1"/>
+          </p:nvPr>
+        </p:nvSpPr>
+        <p:spPr/>
+        <p:txBody>
+          <a:bodyPr/>
+          <a:lstStyle/>
+          <a:p>
+            <a:endParaRPr lang="en-US"/>
+          </a:p>
+        </p:txBody>
+      </p:sp>
+      <p:sp>
+        <p:nvSpPr>
+          <p:cNvPr id="4" name="Slide Number Placeholder 3">
+            <a:extLst>
+              <a:ext uri="{FF2B5EF4-FFF2-40B4-BE49-F238E27FC236}">
+                <a16:creationId xmlns:a16="http://schemas.microsoft.com/office/drawing/2014/main" id="{50A9F02C-6B68-C5F6-2D2C-0D6C6688A32E}"/>
+              </a:ext>
+            </a:extLst>
+          </p:cNvPr>
+          <p:cNvSpPr>
+            <a:spLocks noGrp="1"/>
+          </p:cNvSpPr>
+          <p:nvPr>
+            <p:ph type="sldNum" sz="quarter" idx="10"/>
+          </p:nvPr>
+        </p:nvSpPr>
+        <p:spPr/>
+        <p:txBody>
+          <a:bodyPr/>
+          <a:lstStyle/>
+          <a:p>
+            <a:fld id="{893B0CF2-7F87-4E02-A248-870047730F99}" type="slidenum">
+              <a:rPr lang="en-US" smtClean="0"/>
+              <a:t>7</a:t>
+            </a:fld>
+            <a:endParaRPr lang="en-US"/>
+          </a:p>
+        </p:txBody>
+      </p:sp>
+    </p:spTree>
+    <p:extLst>
+      <p:ext uri="{BB962C8B-B14F-4D97-AF65-F5344CB8AC3E}">
+        <p14:creationId xmlns:p14="http://schemas.microsoft.com/office/powerpoint/2010/main" val="2649773292"/>
       </p:ext>
     </p:extLst>
   </p:cSld>
@@ -7869,6 +7978,611 @@
     <p:extLst>
       <p:ext uri="{BB962C8B-B14F-4D97-AF65-F5344CB8AC3E}">
         <p14:creationId xmlns:p14="http://schemas.microsoft.com/office/powerpoint/2010/main" val="2518873413"/>
+      </p:ext>
+    </p:extLst>
+  </p:cSld>
+  <p:clrMapOvr>
+    <a:masterClrMapping/>
+  </p:clrMapOvr>
+  <mc:AlternateContent xmlns:mc="http://schemas.openxmlformats.org/markup-compatibility/2006">
+    <mc:Choice xmlns:p14="http://schemas.microsoft.com/office/powerpoint/2010/main" Requires="p14">
+      <p:transition spd="med" p14:dur="700">
+        <p:fade/>
+      </p:transition>
+    </mc:Choice>
+    <mc:Fallback>
+      <p:transition spd="med">
+        <p:fade/>
+      </p:transition>
+    </mc:Fallback>
+  </mc:AlternateContent>
+</p:sld>
+</file>
+
+<file path=ppt/slides/slide7.xml><?xml version="1.0" encoding="utf-8"?>
+<p:sld xmlns:a="http://schemas.openxmlformats.org/drawingml/2006/main" xmlns:r="http://schemas.openxmlformats.org/officeDocument/2006/relationships" xmlns:p="http://schemas.openxmlformats.org/presentationml/2006/main">
+  <p:cSld>
+    <p:spTree>
+      <p:nvGrpSpPr>
+        <p:cNvPr id="1" name="">
+          <a:extLst>
+            <a:ext uri="{FF2B5EF4-FFF2-40B4-BE49-F238E27FC236}">
+              <a16:creationId xmlns:a16="http://schemas.microsoft.com/office/drawing/2014/main" id="{7A2F18F0-B19B-5A42-79F9-7648AAB476E1}"/>
+            </a:ext>
+          </a:extLst>
+        </p:cNvPr>
+        <p:cNvGrpSpPr/>
+        <p:nvPr/>
+      </p:nvGrpSpPr>
+      <p:grpSpPr>
+        <a:xfrm>
+          <a:off x="0" y="0"/>
+          <a:ext cx="0" cy="0"/>
+          <a:chOff x="0" y="0"/>
+          <a:chExt cx="0" cy="0"/>
+        </a:xfrm>
+      </p:grpSpPr>
+      <p:sp>
+        <p:nvSpPr>
+          <p:cNvPr id="4" name="Title 3">
+            <a:extLst>
+              <a:ext uri="{FF2B5EF4-FFF2-40B4-BE49-F238E27FC236}">
+                <a16:creationId xmlns:a16="http://schemas.microsoft.com/office/drawing/2014/main" id="{FBBD7D0A-FD39-5AE6-3659-9E6652979EF2}"/>
+              </a:ext>
+            </a:extLst>
+          </p:cNvPr>
+          <p:cNvSpPr>
+            <a:spLocks noGrp="1"/>
+          </p:cNvSpPr>
+          <p:nvPr>
+            <p:ph type="ctrTitle"/>
+          </p:nvPr>
+        </p:nvSpPr>
+        <p:spPr>
+          <a:xfrm>
+            <a:off x="715264" y="349246"/>
+            <a:ext cx="10468864" cy="1828800"/>
+          </a:xfrm>
+        </p:spPr>
+        <p:txBody>
+          <a:bodyPr>
+            <a:normAutofit/>
+          </a:bodyPr>
+          <a:lstStyle/>
+          <a:p>
+            <a:r>
+              <a:rPr lang="zh-CN" altLang="en-US" sz="4400" dirty="0"/>
+              <a:t>使用</a:t>
+            </a:r>
+            <a:r>
+              <a:rPr lang="en-US" altLang="zh-CN" sz="4400" dirty="0"/>
+              <a:t>Protégé</a:t>
+            </a:r>
+            <a:r>
+              <a:rPr lang="zh-CN" altLang="en-US" sz="4400" dirty="0"/>
+              <a:t>建立中国医学本体模型</a:t>
+            </a:r>
+            <a:br>
+              <a:rPr lang="en-US" altLang="zh-CN" sz="4400"/>
+            </a:br>
+            <a:r>
+              <a:rPr lang="en-US" altLang="zh-CN" sz="4400"/>
+              <a:t>CN-MEDO </a:t>
+            </a:r>
+            <a:r>
+              <a:rPr lang="en-US" altLang="zh-CN" sz="4400" dirty="0"/>
+              <a:t>Ontology - </a:t>
+            </a:r>
+            <a:r>
+              <a:rPr lang="en-US" altLang="zh-CN" sz="7200" dirty="0"/>
+              <a:t>006</a:t>
+            </a:r>
+            <a:endParaRPr lang="en-US" sz="4400" dirty="0"/>
+          </a:p>
+        </p:txBody>
+      </p:sp>
+      <p:sp>
+        <p:nvSpPr>
+          <p:cNvPr id="2" name="TextBox 1">
+            <a:extLst>
+              <a:ext uri="{FF2B5EF4-FFF2-40B4-BE49-F238E27FC236}">
+                <a16:creationId xmlns:a16="http://schemas.microsoft.com/office/drawing/2014/main" id="{7BAB936B-6853-96B9-2EA4-CA6824376BE0}"/>
+              </a:ext>
+            </a:extLst>
+          </p:cNvPr>
+          <p:cNvSpPr txBox="1"/>
+          <p:nvPr/>
+        </p:nvSpPr>
+        <p:spPr>
+          <a:xfrm>
+            <a:off x="1255058" y="5253317"/>
+            <a:ext cx="5800178" cy="923330"/>
+          </a:xfrm>
+          <a:prstGeom prst="rect">
+            <a:avLst/>
+          </a:prstGeom>
+          <a:solidFill>
+            <a:schemeClr val="accent3">
+              <a:lumMod val="20000"/>
+              <a:lumOff val="80000"/>
+            </a:schemeClr>
+          </a:solidFill>
+          <a:ln>
+            <a:solidFill>
+              <a:schemeClr val="bg2"/>
+            </a:solidFill>
+          </a:ln>
+        </p:spPr>
+        <p:txBody>
+          <a:bodyPr wrap="none" rtlCol="0">
+            <a:spAutoFit/>
+          </a:bodyPr>
+          <a:lstStyle/>
+          <a:p>
+            <a:r>
+              <a:rPr lang="en-US" dirty="0"/>
+              <a:t>GitHub: </a:t>
+            </a:r>
+            <a:r>
+              <a:rPr lang="en-US" dirty="0">
+                <a:hlinkClick r:id="rId3"/>
+              </a:rPr>
+              <a:t>https://github.com/yasenstar/Chinese_Culture</a:t>
+            </a:r>
+            <a:endParaRPr lang="en-US" dirty="0"/>
+          </a:p>
+          <a:p>
+            <a:endParaRPr lang="en-US" dirty="0"/>
+          </a:p>
+          <a:p>
+            <a:r>
+              <a:rPr lang="en-US" dirty="0"/>
+              <a:t>Gitee: </a:t>
+            </a:r>
+            <a:r>
+              <a:rPr lang="en-US" dirty="0">
+                <a:hlinkClick r:id="rId4"/>
+              </a:rPr>
+              <a:t>https://gitee.com/yasenstar/Chinese_Culture</a:t>
+            </a:r>
+            <a:endParaRPr lang="en-US" dirty="0"/>
+          </a:p>
+        </p:txBody>
+      </p:sp>
+      <p:sp>
+        <p:nvSpPr>
+          <p:cNvPr id="3" name="Subtitle 4">
+            <a:extLst>
+              <a:ext uri="{FF2B5EF4-FFF2-40B4-BE49-F238E27FC236}">
+                <a16:creationId xmlns:a16="http://schemas.microsoft.com/office/drawing/2014/main" id="{A2B4AC1D-9459-E328-CB8B-937B80569488}"/>
+              </a:ext>
+            </a:extLst>
+          </p:cNvPr>
+          <p:cNvSpPr txBox="1">
+            <a:spLocks/>
+          </p:cNvSpPr>
+          <p:nvPr/>
+        </p:nvSpPr>
+        <p:spPr>
+          <a:xfrm>
+            <a:off x="1255059" y="2106706"/>
+            <a:ext cx="6176682" cy="3127232"/>
+          </a:xfrm>
+          <a:prstGeom prst="rect">
+            <a:avLst/>
+          </a:prstGeom>
+        </p:spPr>
+        <p:txBody>
+          <a:bodyPr vert="horz" lIns="0" rIns="18288">
+            <a:normAutofit lnSpcReduction="10000"/>
+          </a:bodyPr>
+          <a:lstStyle>
+            <a:lvl1pPr marL="0" marR="45720" indent="0" algn="r" rtl="0" eaLnBrk="1" latinLnBrk="0" hangingPunct="1">
+              <a:spcBef>
+                <a:spcPct val="20000"/>
+              </a:spcBef>
+              <a:buClr>
+                <a:schemeClr val="accent3">
+                  <a:lumMod val="50000"/>
+                </a:schemeClr>
+              </a:buClr>
+              <a:buSzPct val="95000"/>
+              <a:buFont typeface="Wingdings 2"/>
+              <a:buNone/>
+              <a:defRPr kumimoji="0" sz="2600" kern="1200">
+                <a:solidFill>
+                  <a:schemeClr val="tx1"/>
+                </a:solidFill>
+                <a:latin typeface="+mn-lt"/>
+                <a:ea typeface="+mn-ea"/>
+                <a:cs typeface="+mn-cs"/>
+              </a:defRPr>
+            </a:lvl1pPr>
+            <a:lvl2pPr marL="457200" indent="0" algn="ctr" rtl="0" eaLnBrk="1" latinLnBrk="0" hangingPunct="1">
+              <a:spcBef>
+                <a:spcPct val="20000"/>
+              </a:spcBef>
+              <a:buClr>
+                <a:schemeClr val="accent1">
+                  <a:lumMod val="50000"/>
+                </a:schemeClr>
+              </a:buClr>
+              <a:buSzPct val="85000"/>
+              <a:buFont typeface="Wingdings 2"/>
+              <a:buNone/>
+              <a:defRPr kumimoji="0" sz="2400" kern="1200">
+                <a:solidFill>
+                  <a:schemeClr val="tx1"/>
+                </a:solidFill>
+                <a:latin typeface="+mn-lt"/>
+                <a:ea typeface="+mn-ea"/>
+                <a:cs typeface="+mn-cs"/>
+              </a:defRPr>
+            </a:lvl2pPr>
+            <a:lvl3pPr marL="914400" indent="0" algn="ctr" rtl="0" eaLnBrk="1" latinLnBrk="0" hangingPunct="1">
+              <a:spcBef>
+                <a:spcPct val="20000"/>
+              </a:spcBef>
+              <a:buClr>
+                <a:schemeClr val="accent2">
+                  <a:lumMod val="50000"/>
+                </a:schemeClr>
+              </a:buClr>
+              <a:buSzPct val="70000"/>
+              <a:buFont typeface="Wingdings 2"/>
+              <a:buNone/>
+              <a:defRPr kumimoji="0" sz="2100" kern="1200">
+                <a:solidFill>
+                  <a:schemeClr val="tx1"/>
+                </a:solidFill>
+                <a:latin typeface="+mn-lt"/>
+                <a:ea typeface="+mn-ea"/>
+                <a:cs typeface="+mn-cs"/>
+              </a:defRPr>
+            </a:lvl3pPr>
+            <a:lvl4pPr marL="1371600" indent="0" algn="ctr" rtl="0" eaLnBrk="1" latinLnBrk="0" hangingPunct="1">
+              <a:spcBef>
+                <a:spcPct val="20000"/>
+              </a:spcBef>
+              <a:buClr>
+                <a:schemeClr val="accent3">
+                  <a:lumMod val="50000"/>
+                </a:schemeClr>
+              </a:buClr>
+              <a:buSzPct val="65000"/>
+              <a:buFont typeface="Wingdings 2"/>
+              <a:buNone/>
+              <a:defRPr kumimoji="0" sz="2000" kern="1200">
+                <a:solidFill>
+                  <a:schemeClr val="tx1"/>
+                </a:solidFill>
+                <a:latin typeface="+mn-lt"/>
+                <a:ea typeface="+mn-ea"/>
+                <a:cs typeface="+mn-cs"/>
+              </a:defRPr>
+            </a:lvl4pPr>
+            <a:lvl5pPr marL="1828800" indent="0" algn="ctr" rtl="0" eaLnBrk="1" latinLnBrk="0" hangingPunct="1">
+              <a:spcBef>
+                <a:spcPct val="20000"/>
+              </a:spcBef>
+              <a:buClr>
+                <a:schemeClr val="accent4">
+                  <a:lumMod val="75000"/>
+                </a:schemeClr>
+              </a:buClr>
+              <a:buSzPct val="65000"/>
+              <a:buFont typeface="Wingdings 2"/>
+              <a:buNone/>
+              <a:defRPr kumimoji="0" sz="2000" kern="1200">
+                <a:solidFill>
+                  <a:schemeClr val="tx1"/>
+                </a:solidFill>
+                <a:latin typeface="+mn-lt"/>
+                <a:ea typeface="+mn-ea"/>
+                <a:cs typeface="+mn-cs"/>
+              </a:defRPr>
+            </a:lvl5pPr>
+            <a:lvl6pPr marL="2286000" indent="0" algn="ctr" rtl="0" eaLnBrk="1" latinLnBrk="0" hangingPunct="1">
+              <a:spcBef>
+                <a:spcPct val="20000"/>
+              </a:spcBef>
+              <a:buClr>
+                <a:schemeClr val="accent5">
+                  <a:lumMod val="50000"/>
+                </a:schemeClr>
+              </a:buClr>
+              <a:buSzPct val="80000"/>
+              <a:buFont typeface="Wingdings 2"/>
+              <a:buNone/>
+              <a:defRPr kumimoji="0" sz="1800" kern="1200">
+                <a:solidFill>
+                  <a:schemeClr val="tx1"/>
+                </a:solidFill>
+                <a:latin typeface="+mn-lt"/>
+                <a:ea typeface="+mn-ea"/>
+                <a:cs typeface="+mn-cs"/>
+              </a:defRPr>
+            </a:lvl6pPr>
+            <a:lvl7pPr marL="2743200" indent="0" algn="ctr" rtl="0" eaLnBrk="1" latinLnBrk="0" hangingPunct="1">
+              <a:spcBef>
+                <a:spcPct val="20000"/>
+              </a:spcBef>
+              <a:buClr>
+                <a:schemeClr val="accent6">
+                  <a:lumMod val="75000"/>
+                </a:schemeClr>
+              </a:buClr>
+              <a:buSzPct val="80000"/>
+              <a:buFont typeface="Wingdings 2"/>
+              <a:buNone/>
+              <a:defRPr kumimoji="0" sz="1600" kern="1200" baseline="0">
+                <a:solidFill>
+                  <a:schemeClr val="tx1"/>
+                </a:solidFill>
+                <a:latin typeface="+mn-lt"/>
+                <a:ea typeface="+mn-ea"/>
+                <a:cs typeface="+mn-cs"/>
+              </a:defRPr>
+            </a:lvl7pPr>
+            <a:lvl8pPr marL="3200400" indent="0" algn="ctr" rtl="0" eaLnBrk="1" latinLnBrk="0" hangingPunct="1">
+              <a:spcBef>
+                <a:spcPct val="20000"/>
+              </a:spcBef>
+              <a:buClr>
+                <a:schemeClr val="tx2"/>
+              </a:buClr>
+              <a:buNone/>
+              <a:defRPr kumimoji="0" sz="1600" kern="1200">
+                <a:solidFill>
+                  <a:schemeClr val="tx1"/>
+                </a:solidFill>
+                <a:latin typeface="+mn-lt"/>
+                <a:ea typeface="+mn-ea"/>
+                <a:cs typeface="+mn-cs"/>
+              </a:defRPr>
+            </a:lvl8pPr>
+            <a:lvl9pPr marL="3657600" indent="0" algn="ctr" rtl="0" eaLnBrk="1" latinLnBrk="0" hangingPunct="1">
+              <a:spcBef>
+                <a:spcPct val="20000"/>
+              </a:spcBef>
+              <a:buClr>
+                <a:schemeClr val="tx2"/>
+              </a:buClr>
+              <a:buFontTx/>
+              <a:buNone/>
+              <a:defRPr kumimoji="0" sz="1400" kern="1200" baseline="0">
+                <a:solidFill>
+                  <a:schemeClr val="tx1"/>
+                </a:solidFill>
+                <a:latin typeface="+mn-lt"/>
+                <a:ea typeface="+mn-ea"/>
+                <a:cs typeface="+mn-cs"/>
+              </a:defRPr>
+            </a:lvl9pPr>
+          </a:lstStyle>
+          <a:p>
+            <a:pPr marL="457200" indent="-457200" algn="l">
+              <a:buFont typeface="Arial" panose="020B0604020202020204" pitchFamily="34" charset="0"/>
+              <a:buChar char="•"/>
+            </a:pPr>
+            <a:r>
+              <a:rPr lang="zh-CN" altLang="en-US" dirty="0"/>
+              <a:t>对“小青龙汤方”进行</a:t>
+            </a:r>
+            <a:r>
+              <a:rPr lang="en-US" altLang="zh-CN" dirty="0"/>
+              <a:t>Ontology</a:t>
+            </a:r>
+            <a:r>
+              <a:rPr lang="zh-CN" altLang="en-US" dirty="0"/>
+              <a:t>建模</a:t>
+            </a:r>
+            <a:endParaRPr lang="en-US" altLang="zh-CN" dirty="0"/>
+          </a:p>
+          <a:p>
+            <a:pPr marL="914400" lvl="1" indent="-457200" algn="l">
+              <a:buFont typeface="Arial" panose="020B0604020202020204" pitchFamily="34" charset="0"/>
+              <a:buChar char="•"/>
+            </a:pPr>
+            <a:r>
+              <a:rPr lang="zh-CN" altLang="en-US" dirty="0"/>
+              <a:t>药品</a:t>
+            </a:r>
+            <a:r>
+              <a:rPr lang="en-US" altLang="zh-CN" dirty="0"/>
+              <a:t>class / individual</a:t>
+            </a:r>
+          </a:p>
+          <a:p>
+            <a:pPr marL="914400" lvl="1" indent="-457200" algn="l">
+              <a:buFont typeface="Arial" panose="020B0604020202020204" pitchFamily="34" charset="0"/>
+              <a:buChar char="•"/>
+            </a:pPr>
+            <a:r>
+              <a:rPr lang="zh-CN" altLang="en-US" dirty="0"/>
+              <a:t>病证</a:t>
+            </a:r>
+            <a:r>
+              <a:rPr lang="en-US" altLang="zh-CN" dirty="0"/>
+              <a:t>class / individual</a:t>
+            </a:r>
+          </a:p>
+          <a:p>
+            <a:pPr marL="914400" lvl="1" indent="-457200" algn="l">
+              <a:buFont typeface="Arial" panose="020B0604020202020204" pitchFamily="34" charset="0"/>
+              <a:buChar char="•"/>
+            </a:pPr>
+            <a:r>
+              <a:rPr lang="zh-CN" altLang="en-US" dirty="0"/>
+              <a:t>药方</a:t>
+            </a:r>
+            <a:r>
+              <a:rPr lang="en-US" altLang="zh-CN" dirty="0"/>
+              <a:t>class / individual</a:t>
+            </a:r>
+          </a:p>
+          <a:p>
+            <a:pPr marL="457200" indent="-457200" algn="l">
+              <a:buFont typeface="Arial" panose="020B0604020202020204" pitchFamily="34" charset="0"/>
+              <a:buChar char="•"/>
+            </a:pPr>
+            <a:r>
+              <a:rPr lang="zh-CN" altLang="en-US" dirty="0"/>
+              <a:t>建立如下</a:t>
+            </a:r>
+            <a:r>
+              <a:rPr lang="en-US" altLang="zh-CN" dirty="0"/>
+              <a:t>Protégé object property:</a:t>
+            </a:r>
+          </a:p>
+          <a:p>
+            <a:pPr marL="914400" lvl="1" indent="-457200" algn="l">
+              <a:buFont typeface="Arial" panose="020B0604020202020204" pitchFamily="34" charset="0"/>
+              <a:buChar char="•"/>
+            </a:pPr>
+            <a:r>
+              <a:rPr lang="zh-CN" altLang="en-US" dirty="0"/>
+              <a:t>药方与药品的组分</a:t>
+            </a:r>
+            <a:endParaRPr lang="en-US" altLang="zh-CN" dirty="0"/>
+          </a:p>
+          <a:p>
+            <a:pPr marL="914400" lvl="1" indent="-457200" algn="l">
+              <a:buFont typeface="Arial" panose="020B0604020202020204" pitchFamily="34" charset="0"/>
+              <a:buChar char="•"/>
+            </a:pPr>
+            <a:r>
+              <a:rPr lang="zh-CN" altLang="en-US" dirty="0"/>
+              <a:t>示例药品药性</a:t>
+            </a:r>
+            <a:endParaRPr lang="en-US" dirty="0"/>
+          </a:p>
+        </p:txBody>
+      </p:sp>
+      <p:pic>
+        <p:nvPicPr>
+          <p:cNvPr id="7" name="Picture 6">
+            <a:extLst>
+              <a:ext uri="{FF2B5EF4-FFF2-40B4-BE49-F238E27FC236}">
+                <a16:creationId xmlns:a16="http://schemas.microsoft.com/office/drawing/2014/main" id="{2E261CD0-0865-67BA-DEA2-604F10B3C1B5}"/>
+              </a:ext>
+            </a:extLst>
+          </p:cNvPr>
+          <p:cNvPicPr>
+            <a:picLocks noChangeAspect="1"/>
+          </p:cNvPicPr>
+          <p:nvPr/>
+        </p:nvPicPr>
+        <p:blipFill>
+          <a:blip r:embed="rId5"/>
+          <a:stretch>
+            <a:fillRect/>
+          </a:stretch>
+        </p:blipFill>
+        <p:spPr>
+          <a:xfrm>
+            <a:off x="7519098" y="2977014"/>
+            <a:ext cx="1507663" cy="2094858"/>
+          </a:xfrm>
+          <a:prstGeom prst="rect">
+            <a:avLst/>
+          </a:prstGeom>
+          <a:ln>
+            <a:noFill/>
+          </a:ln>
+          <a:effectLst>
+            <a:outerShdw blurRad="292100" dist="139700" dir="2700000" algn="tl" rotWithShape="0">
+              <a:srgbClr val="333333">
+                <a:alpha val="65000"/>
+              </a:srgbClr>
+            </a:outerShdw>
+          </a:effectLst>
+        </p:spPr>
+      </p:pic>
+      <p:pic>
+        <p:nvPicPr>
+          <p:cNvPr id="10" name="Picture 9">
+            <a:extLst>
+              <a:ext uri="{FF2B5EF4-FFF2-40B4-BE49-F238E27FC236}">
+                <a16:creationId xmlns:a16="http://schemas.microsoft.com/office/drawing/2014/main" id="{E425FC0A-0445-F5DE-5645-DD9EC5561E5F}"/>
+              </a:ext>
+            </a:extLst>
+          </p:cNvPr>
+          <p:cNvPicPr>
+            <a:picLocks noChangeAspect="1"/>
+          </p:cNvPicPr>
+          <p:nvPr/>
+        </p:nvPicPr>
+        <p:blipFill>
+          <a:blip r:embed="rId6"/>
+          <a:stretch>
+            <a:fillRect/>
+          </a:stretch>
+        </p:blipFill>
+        <p:spPr>
+          <a:xfrm>
+            <a:off x="9438068" y="2977014"/>
+            <a:ext cx="1559116" cy="2094858"/>
+          </a:xfrm>
+          <a:prstGeom prst="rect">
+            <a:avLst/>
+          </a:prstGeom>
+          <a:ln>
+            <a:noFill/>
+          </a:ln>
+          <a:effectLst>
+            <a:outerShdw blurRad="292100" dist="139700" dir="2700000" algn="tl" rotWithShape="0">
+              <a:srgbClr val="333333">
+                <a:alpha val="65000"/>
+              </a:srgbClr>
+            </a:outerShdw>
+          </a:effectLst>
+        </p:spPr>
+      </p:pic>
+      <p:pic>
+        <p:nvPicPr>
+          <p:cNvPr id="14" name="Picture 13">
+            <a:extLst>
+              <a:ext uri="{FF2B5EF4-FFF2-40B4-BE49-F238E27FC236}">
+                <a16:creationId xmlns:a16="http://schemas.microsoft.com/office/drawing/2014/main" id="{383F1D55-D473-49D7-54AF-75EBD5D5FB94}"/>
+              </a:ext>
+            </a:extLst>
+          </p:cNvPr>
+          <p:cNvPicPr>
+            <a:picLocks noChangeAspect="1"/>
+          </p:cNvPicPr>
+          <p:nvPr/>
+        </p:nvPicPr>
+        <p:blipFill>
+          <a:blip r:embed="rId7"/>
+          <a:stretch>
+            <a:fillRect/>
+          </a:stretch>
+        </p:blipFill>
+        <p:spPr>
+          <a:xfrm>
+            <a:off x="116923" y="6284428"/>
+            <a:ext cx="2120630" cy="441606"/>
+          </a:xfrm>
+          <a:prstGeom prst="rect">
+            <a:avLst/>
+          </a:prstGeom>
+          <a:ln>
+            <a:noFill/>
+          </a:ln>
+          <a:effectLst>
+            <a:outerShdw blurRad="292100" dist="139700" dir="2700000" algn="tl" rotWithShape="0">
+              <a:srgbClr val="333333">
+                <a:alpha val="65000"/>
+              </a:srgbClr>
+            </a:outerShdw>
+          </a:effectLst>
+        </p:spPr>
+      </p:pic>
+    </p:spTree>
+    <p:extLst>
+      <p:ext uri="{BB962C8B-B14F-4D97-AF65-F5344CB8AC3E}">
+        <p14:creationId xmlns:p14="http://schemas.microsoft.com/office/powerpoint/2010/main" val="78055737"/>
       </p:ext>
     </p:extLst>
   </p:cSld>

</xml_diff>